<commit_message>
before merge with indexed list
</commit_message>
<xml_diff>
--- a/开发相关文档.pptx
+++ b/开发相关文档.pptx
@@ -6,6 +6,8 @@
   </p:sldMasterIdLst>
   <p:sldIdLst>
     <p:sldId id="256" r:id="rId2"/>
+    <p:sldId id="257" r:id="rId3"/>
+    <p:sldId id="258" r:id="rId4"/>
   </p:sldIdLst>
   <p:sldSz cx="12192000" cy="6858000"/>
   <p:notesSz cx="6858000" cy="9144000"/>
@@ -104,7 +106,180 @@
       </a:defRPr>
     </a:lvl9pPr>
   </p:defaultTextStyle>
+  <p:extLst>
+    <p:ext uri="{EFAFB233-063F-42B5-8137-9DF3F51BA10A}">
+      <p15:sldGuideLst xmlns:p15="http://schemas.microsoft.com/office/powerpoint/2012/main"/>
+    </p:ext>
+  </p:extLst>
 </p:presentation>
+</file>
+
+<file path=ppt/revisionInfo.xml><?xml version="1.0" encoding="utf-8"?>
+<p1510:revInfo xmlns:a="http://schemas.openxmlformats.org/drawingml/2006/main" xmlns:r="http://schemas.openxmlformats.org/officeDocument/2006/relationships" xmlns:p1510="http://schemas.microsoft.com/office/powerpoint/2015/10/main">
+  <p1510:revLst>
+    <p1510:client id="{54D8F212-525F-4A08-AFA3-A94259C05EBD}" v="16" dt="2023-04-29T14:55:55.756"/>
+  </p1510:revLst>
+</p1510:revInfo>
+</file>
+
+<file path=ppt/changesInfos/changesInfo1.xml><?xml version="1.0" encoding="utf-8"?>
+<pc:chgInfo xmlns:a="http://schemas.openxmlformats.org/drawingml/2006/main" xmlns:r="http://schemas.openxmlformats.org/officeDocument/2006/relationships" xmlns:ac="http://schemas.microsoft.com/office/drawing/2013/main/command" xmlns:pc="http://schemas.microsoft.com/office/powerpoint/2013/main/command">
+  <pc:docChgLst>
+    <pc:chgData name="赵 柘楷" userId="dac37f91-8d7e-4e9e-af67-31d1ff408659" providerId="ADAL" clId="{54D8F212-525F-4A08-AFA3-A94259C05EBD}"/>
+    <pc:docChg chg="undo custSel addSld delSld modSld">
+      <pc:chgData name="赵 柘楷" userId="dac37f91-8d7e-4e9e-af67-31d1ff408659" providerId="ADAL" clId="{54D8F212-525F-4A08-AFA3-A94259C05EBD}" dt="2023-04-30T00:45:29.139" v="253" actId="207"/>
+      <pc:docMkLst>
+        <pc:docMk/>
+      </pc:docMkLst>
+      <pc:sldChg chg="addSp delSp">
+        <pc:chgData name="赵 柘楷" userId="dac37f91-8d7e-4e9e-af67-31d1ff408659" providerId="ADAL" clId="{54D8F212-525F-4A08-AFA3-A94259C05EBD}" dt="2023-04-29T14:50:01.923" v="3"/>
+        <pc:sldMkLst>
+          <pc:docMk/>
+          <pc:sldMk cId="2948107791" sldId="256"/>
+        </pc:sldMkLst>
+        <pc:picChg chg="add del">
+          <ac:chgData name="赵 柘楷" userId="dac37f91-8d7e-4e9e-af67-31d1ff408659" providerId="ADAL" clId="{54D8F212-525F-4A08-AFA3-A94259C05EBD}" dt="2023-04-29T14:50:01.923" v="3"/>
+          <ac:picMkLst>
+            <pc:docMk/>
+            <pc:sldMk cId="2948107791" sldId="256"/>
+            <ac:picMk id="2" creationId="{D25BA29F-C9DE-4317-16B7-D1889256902E}"/>
+          </ac:picMkLst>
+        </pc:picChg>
+      </pc:sldChg>
+      <pc:sldChg chg="add del setBg">
+        <pc:chgData name="赵 柘楷" userId="dac37f91-8d7e-4e9e-af67-31d1ff408659" providerId="ADAL" clId="{54D8F212-525F-4A08-AFA3-A94259C05EBD}" dt="2023-04-29T14:50:00.843" v="1"/>
+        <pc:sldMkLst>
+          <pc:docMk/>
+          <pc:sldMk cId="64055223" sldId="257"/>
+        </pc:sldMkLst>
+      </pc:sldChg>
+      <pc:sldChg chg="modSp add mod">
+        <pc:chgData name="赵 柘楷" userId="dac37f91-8d7e-4e9e-af67-31d1ff408659" providerId="ADAL" clId="{54D8F212-525F-4A08-AFA3-A94259C05EBD}" dt="2023-04-29T14:50:13.683" v="14" actId="20577"/>
+        <pc:sldMkLst>
+          <pc:docMk/>
+          <pc:sldMk cId="2094594516" sldId="257"/>
+        </pc:sldMkLst>
+        <pc:spChg chg="mod">
+          <ac:chgData name="赵 柘楷" userId="dac37f91-8d7e-4e9e-af67-31d1ff408659" providerId="ADAL" clId="{54D8F212-525F-4A08-AFA3-A94259C05EBD}" dt="2023-04-29T14:50:13.683" v="14" actId="20577"/>
+          <ac:spMkLst>
+            <pc:docMk/>
+            <pc:sldMk cId="2094594516" sldId="257"/>
+            <ac:spMk id="9" creationId="{A399E17B-3EE7-70F0-83AE-0627FA4E99DE}"/>
+          </ac:spMkLst>
+        </pc:spChg>
+        <pc:spChg chg="mod">
+          <ac:chgData name="赵 柘楷" userId="dac37f91-8d7e-4e9e-af67-31d1ff408659" providerId="ADAL" clId="{54D8F212-525F-4A08-AFA3-A94259C05EBD}" dt="2023-04-29T14:50:08.563" v="10" actId="20577"/>
+          <ac:spMkLst>
+            <pc:docMk/>
+            <pc:sldMk cId="2094594516" sldId="257"/>
+            <ac:spMk id="10" creationId="{399EC284-046B-9279-CB34-FA0E88CB07B1}"/>
+          </ac:spMkLst>
+        </pc:spChg>
+      </pc:sldChg>
+      <pc:sldChg chg="add del setBg">
+        <pc:chgData name="赵 柘楷" userId="dac37f91-8d7e-4e9e-af67-31d1ff408659" providerId="ADAL" clId="{54D8F212-525F-4A08-AFA3-A94259C05EBD}" dt="2023-04-29T14:50:04.533" v="5"/>
+        <pc:sldMkLst>
+          <pc:docMk/>
+          <pc:sldMk cId="3964414160" sldId="257"/>
+        </pc:sldMkLst>
+      </pc:sldChg>
+      <pc:sldChg chg="addSp delSp modSp add mod">
+        <pc:chgData name="赵 柘楷" userId="dac37f91-8d7e-4e9e-af67-31d1ff408659" providerId="ADAL" clId="{54D8F212-525F-4A08-AFA3-A94259C05EBD}" dt="2023-04-30T00:45:29.139" v="253" actId="207"/>
+        <pc:sldMkLst>
+          <pc:docMk/>
+          <pc:sldMk cId="456294878" sldId="258"/>
+        </pc:sldMkLst>
+        <pc:spChg chg="add mod">
+          <ac:chgData name="赵 柘楷" userId="dac37f91-8d7e-4e9e-af67-31d1ff408659" providerId="ADAL" clId="{54D8F212-525F-4A08-AFA3-A94259C05EBD}" dt="2023-04-29T14:55:31.869" v="117" actId="164"/>
+          <ac:spMkLst>
+            <pc:docMk/>
+            <pc:sldMk cId="456294878" sldId="258"/>
+            <ac:spMk id="2" creationId="{9826F35A-D9CB-7762-8632-DB41DB84C8E3}"/>
+          </ac:spMkLst>
+        </pc:spChg>
+        <pc:spChg chg="add del mod">
+          <ac:chgData name="赵 柘楷" userId="dac37f91-8d7e-4e9e-af67-31d1ff408659" providerId="ADAL" clId="{54D8F212-525F-4A08-AFA3-A94259C05EBD}" dt="2023-04-29T14:55:10.846" v="115" actId="478"/>
+          <ac:spMkLst>
+            <pc:docMk/>
+            <pc:sldMk cId="456294878" sldId="258"/>
+            <ac:spMk id="3" creationId="{3D367676-718D-6794-D92F-4A3AA790674E}"/>
+          </ac:spMkLst>
+        </pc:spChg>
+        <pc:spChg chg="add mod">
+          <ac:chgData name="赵 柘楷" userId="dac37f91-8d7e-4e9e-af67-31d1ff408659" providerId="ADAL" clId="{54D8F212-525F-4A08-AFA3-A94259C05EBD}" dt="2023-04-30T00:45:29.139" v="253" actId="207"/>
+          <ac:spMkLst>
+            <pc:docMk/>
+            <pc:sldMk cId="456294878" sldId="258"/>
+            <ac:spMk id="5" creationId="{F185A681-09BC-236A-1C54-43A4E142B957}"/>
+          </ac:spMkLst>
+        </pc:spChg>
+        <pc:spChg chg="mod">
+          <ac:chgData name="赵 柘楷" userId="dac37f91-8d7e-4e9e-af67-31d1ff408659" providerId="ADAL" clId="{54D8F212-525F-4A08-AFA3-A94259C05EBD}" dt="2023-04-29T14:53:12.353" v="71" actId="1076"/>
+          <ac:spMkLst>
+            <pc:docMk/>
+            <pc:sldMk cId="456294878" sldId="258"/>
+            <ac:spMk id="8" creationId="{C04EF757-5938-73F9-6E38-A648015B7730}"/>
+          </ac:spMkLst>
+        </pc:spChg>
+        <pc:spChg chg="del">
+          <ac:chgData name="赵 柘楷" userId="dac37f91-8d7e-4e9e-af67-31d1ff408659" providerId="ADAL" clId="{54D8F212-525F-4A08-AFA3-A94259C05EBD}" dt="2023-04-29T14:50:44.213" v="18" actId="478"/>
+          <ac:spMkLst>
+            <pc:docMk/>
+            <pc:sldMk cId="456294878" sldId="258"/>
+            <ac:spMk id="9" creationId="{A399E17B-3EE7-70F0-83AE-0627FA4E99DE}"/>
+          </ac:spMkLst>
+        </pc:spChg>
+        <pc:spChg chg="del">
+          <ac:chgData name="赵 柘楷" userId="dac37f91-8d7e-4e9e-af67-31d1ff408659" providerId="ADAL" clId="{54D8F212-525F-4A08-AFA3-A94259C05EBD}" dt="2023-04-29T14:50:46.503" v="19" actId="478"/>
+          <ac:spMkLst>
+            <pc:docMk/>
+            <pc:sldMk cId="456294878" sldId="258"/>
+            <ac:spMk id="10" creationId="{399EC284-046B-9279-CB34-FA0E88CB07B1}"/>
+          </ac:spMkLst>
+        </pc:spChg>
+        <pc:grpChg chg="add mod">
+          <ac:chgData name="赵 柘楷" userId="dac37f91-8d7e-4e9e-af67-31d1ff408659" providerId="ADAL" clId="{54D8F212-525F-4A08-AFA3-A94259C05EBD}" dt="2023-04-29T14:55:35.481" v="118" actId="1076"/>
+          <ac:grpSpMkLst>
+            <pc:docMk/>
+            <pc:sldMk cId="456294878" sldId="258"/>
+            <ac:grpSpMk id="4" creationId="{B066532D-BECE-0DC9-7BAF-A87DB555866B}"/>
+          </ac:grpSpMkLst>
+        </pc:grpChg>
+        <pc:grpChg chg="del">
+          <ac:chgData name="赵 柘楷" userId="dac37f91-8d7e-4e9e-af67-31d1ff408659" providerId="ADAL" clId="{54D8F212-525F-4A08-AFA3-A94259C05EBD}" dt="2023-04-29T14:50:46.503" v="19" actId="478"/>
+          <ac:grpSpMkLst>
+            <pc:docMk/>
+            <pc:sldMk cId="456294878" sldId="258"/>
+            <ac:grpSpMk id="11" creationId="{B69C46E6-9C94-4C91-0938-550200414F3B}"/>
+          </ac:grpSpMkLst>
+        </pc:grpChg>
+        <pc:grpChg chg="mod">
+          <ac:chgData name="赵 柘楷" userId="dac37f91-8d7e-4e9e-af67-31d1ff408659" providerId="ADAL" clId="{54D8F212-525F-4A08-AFA3-A94259C05EBD}" dt="2023-04-29T14:55:31.869" v="117" actId="164"/>
+          <ac:grpSpMkLst>
+            <pc:docMk/>
+            <pc:sldMk cId="456294878" sldId="258"/>
+            <ac:grpSpMk id="14" creationId="{CFB24489-5300-69E3-F669-5B9D13DA49E5}"/>
+          </ac:grpSpMkLst>
+        </pc:grpChg>
+        <pc:picChg chg="mod">
+          <ac:chgData name="赵 柘楷" userId="dac37f91-8d7e-4e9e-af67-31d1ff408659" providerId="ADAL" clId="{54D8F212-525F-4A08-AFA3-A94259C05EBD}" dt="2023-04-29T14:53:07.663" v="69"/>
+          <ac:picMkLst>
+            <pc:docMk/>
+            <pc:sldMk cId="456294878" sldId="258"/>
+            <ac:picMk id="13" creationId="{AB553BBC-8AD6-F74D-EC32-30E7D3CAF8CD}"/>
+          </ac:picMkLst>
+        </pc:picChg>
+      </pc:sldChg>
+      <pc:sldChg chg="add del setBg">
+        <pc:chgData name="赵 柘楷" userId="dac37f91-8d7e-4e9e-af67-31d1ff408659" providerId="ADAL" clId="{54D8F212-525F-4A08-AFA3-A94259C05EBD}" dt="2023-04-29T14:50:34.803" v="16"/>
+        <pc:sldMkLst>
+          <pc:docMk/>
+          <pc:sldMk cId="3235983508" sldId="258"/>
+        </pc:sldMkLst>
+      </pc:sldChg>
+    </pc:docChg>
+  </pc:docChgLst>
+</pc:chgInfo>
 </file>
 
 <file path=ppt/slideLayouts/slideLayout1.xml><?xml version="1.0" encoding="utf-8"?>
@@ -254,7 +429,7 @@
           <a:p>
             <a:fld id="{C0956A83-B036-4B96-AF66-88CDD33BBE5A}" type="datetimeFigureOut">
               <a:rPr lang="zh-CN" altLang="en-US" smtClean="0"/>
-              <a:t>2023/1/5</a:t>
+              <a:t>2023/4/30</a:t>
             </a:fld>
             <a:endParaRPr lang="zh-CN" altLang="en-US"/>
           </a:p>
@@ -452,7 +627,7 @@
           <a:p>
             <a:fld id="{C0956A83-B036-4B96-AF66-88CDD33BBE5A}" type="datetimeFigureOut">
               <a:rPr lang="zh-CN" altLang="en-US" smtClean="0"/>
-              <a:t>2023/1/5</a:t>
+              <a:t>2023/4/30</a:t>
             </a:fld>
             <a:endParaRPr lang="zh-CN" altLang="en-US"/>
           </a:p>
@@ -660,7 +835,7 @@
           <a:p>
             <a:fld id="{C0956A83-B036-4B96-AF66-88CDD33BBE5A}" type="datetimeFigureOut">
               <a:rPr lang="zh-CN" altLang="en-US" smtClean="0"/>
-              <a:t>2023/1/5</a:t>
+              <a:t>2023/4/30</a:t>
             </a:fld>
             <a:endParaRPr lang="zh-CN" altLang="en-US"/>
           </a:p>
@@ -858,7 +1033,7 @@
           <a:p>
             <a:fld id="{C0956A83-B036-4B96-AF66-88CDD33BBE5A}" type="datetimeFigureOut">
               <a:rPr lang="zh-CN" altLang="en-US" smtClean="0"/>
-              <a:t>2023/1/5</a:t>
+              <a:t>2023/4/30</a:t>
             </a:fld>
             <a:endParaRPr lang="zh-CN" altLang="en-US"/>
           </a:p>
@@ -1133,7 +1308,7 @@
           <a:p>
             <a:fld id="{C0956A83-B036-4B96-AF66-88CDD33BBE5A}" type="datetimeFigureOut">
               <a:rPr lang="zh-CN" altLang="en-US" smtClean="0"/>
-              <a:t>2023/1/5</a:t>
+              <a:t>2023/4/30</a:t>
             </a:fld>
             <a:endParaRPr lang="zh-CN" altLang="en-US"/>
           </a:p>
@@ -1398,7 +1573,7 @@
           <a:p>
             <a:fld id="{C0956A83-B036-4B96-AF66-88CDD33BBE5A}" type="datetimeFigureOut">
               <a:rPr lang="zh-CN" altLang="en-US" smtClean="0"/>
-              <a:t>2023/1/5</a:t>
+              <a:t>2023/4/30</a:t>
             </a:fld>
             <a:endParaRPr lang="zh-CN" altLang="en-US"/>
           </a:p>
@@ -1810,7 +1985,7 @@
           <a:p>
             <a:fld id="{C0956A83-B036-4B96-AF66-88CDD33BBE5A}" type="datetimeFigureOut">
               <a:rPr lang="zh-CN" altLang="en-US" smtClean="0"/>
-              <a:t>2023/1/5</a:t>
+              <a:t>2023/4/30</a:t>
             </a:fld>
             <a:endParaRPr lang="zh-CN" altLang="en-US"/>
           </a:p>
@@ -1951,7 +2126,7 @@
           <a:p>
             <a:fld id="{C0956A83-B036-4B96-AF66-88CDD33BBE5A}" type="datetimeFigureOut">
               <a:rPr lang="zh-CN" altLang="en-US" smtClean="0"/>
-              <a:t>2023/1/5</a:t>
+              <a:t>2023/4/30</a:t>
             </a:fld>
             <a:endParaRPr lang="zh-CN" altLang="en-US"/>
           </a:p>
@@ -2064,7 +2239,7 @@
           <a:p>
             <a:fld id="{C0956A83-B036-4B96-AF66-88CDD33BBE5A}" type="datetimeFigureOut">
               <a:rPr lang="zh-CN" altLang="en-US" smtClean="0"/>
-              <a:t>2023/1/5</a:t>
+              <a:t>2023/4/30</a:t>
             </a:fld>
             <a:endParaRPr lang="zh-CN" altLang="en-US"/>
           </a:p>
@@ -2375,7 +2550,7 @@
           <a:p>
             <a:fld id="{C0956A83-B036-4B96-AF66-88CDD33BBE5A}" type="datetimeFigureOut">
               <a:rPr lang="zh-CN" altLang="en-US" smtClean="0"/>
-              <a:t>2023/1/5</a:t>
+              <a:t>2023/4/30</a:t>
             </a:fld>
             <a:endParaRPr lang="zh-CN" altLang="en-US"/>
           </a:p>
@@ -2663,7 +2838,7 @@
           <a:p>
             <a:fld id="{C0956A83-B036-4B96-AF66-88CDD33BBE5A}" type="datetimeFigureOut">
               <a:rPr lang="zh-CN" altLang="en-US" smtClean="0"/>
-              <a:t>2023/1/5</a:t>
+              <a:t>2023/4/30</a:t>
             </a:fld>
             <a:endParaRPr lang="zh-CN" altLang="en-US"/>
           </a:p>
@@ -2904,7 +3079,7 @@
           <a:p>
             <a:fld id="{C0956A83-B036-4B96-AF66-88CDD33BBE5A}" type="datetimeFigureOut">
               <a:rPr lang="zh-CN" altLang="en-US" smtClean="0"/>
-              <a:t>2023/1/5</a:t>
+              <a:t>2023/4/30</a:t>
             </a:fld>
             <a:endParaRPr lang="zh-CN" altLang="en-US"/>
           </a:p>
@@ -3644,6 +3819,986 @@
 </p:sld>
 </file>
 
+<file path=ppt/slides/slide2.xml><?xml version="1.0" encoding="utf-8"?>
+<p:sld xmlns:a="http://schemas.openxmlformats.org/drawingml/2006/main" xmlns:r="http://schemas.openxmlformats.org/officeDocument/2006/relationships" xmlns:p="http://schemas.openxmlformats.org/presentationml/2006/main">
+  <p:cSld>
+    <p:bg>
+      <p:bgPr>
+        <a:solidFill>
+          <a:schemeClr val="bg2"/>
+        </a:solidFill>
+        <a:effectLst/>
+      </p:bgPr>
+    </p:bg>
+    <p:spTree>
+      <p:nvGrpSpPr>
+        <p:cNvPr id="1" name=""/>
+        <p:cNvGrpSpPr/>
+        <p:nvPr/>
+      </p:nvGrpSpPr>
+      <p:grpSpPr>
+        <a:xfrm>
+          <a:off x="0" y="0"/>
+          <a:ext cx="0" cy="0"/>
+          <a:chOff x="0" y="0"/>
+          <a:chExt cx="0" cy="0"/>
+        </a:xfrm>
+      </p:grpSpPr>
+      <p:grpSp>
+        <p:nvGrpSpPr>
+          <p:cNvPr id="14" name="组合 13">
+            <a:extLst>
+              <a:ext uri="{FF2B5EF4-FFF2-40B4-BE49-F238E27FC236}">
+                <a16:creationId xmlns:a16="http://schemas.microsoft.com/office/drawing/2014/main" id="{CFB24489-5300-69E3-F669-5B9D13DA49E5}"/>
+              </a:ext>
+            </a:extLst>
+          </p:cNvPr>
+          <p:cNvGrpSpPr/>
+          <p:nvPr/>
+        </p:nvGrpSpPr>
+        <p:grpSpPr>
+          <a:xfrm>
+            <a:off x="1169643" y="1588656"/>
+            <a:ext cx="9852713" cy="3442947"/>
+            <a:chOff x="1169643" y="1588656"/>
+            <a:chExt cx="9852713" cy="3442947"/>
+          </a:xfrm>
+        </p:grpSpPr>
+        <p:pic>
+          <p:nvPicPr>
+            <p:cNvPr id="13" name="图片 12" descr="徽标&#10;&#10;描述已自动生成">
+              <a:extLst>
+                <a:ext uri="{FF2B5EF4-FFF2-40B4-BE49-F238E27FC236}">
+                  <a16:creationId xmlns:a16="http://schemas.microsoft.com/office/drawing/2014/main" id="{AB553BBC-8AD6-F74D-EC32-30E7D3CAF8CD}"/>
+                </a:ext>
+              </a:extLst>
+            </p:cNvPr>
+            <p:cNvPicPr>
+              <a:picLocks noChangeAspect="1"/>
+            </p:cNvPicPr>
+            <p:nvPr/>
+          </p:nvPicPr>
+          <p:blipFill>
+            <a:blip r:embed="rId2">
+              <a:extLst>
+                <a:ext uri="{28A0092B-C50C-407E-A947-70E740481C1C}">
+                  <a14:useLocalDpi xmlns:a14="http://schemas.microsoft.com/office/drawing/2010/main" val="0"/>
+                </a:ext>
+              </a:extLst>
+            </a:blip>
+            <a:stretch>
+              <a:fillRect/>
+            </a:stretch>
+          </p:blipFill>
+          <p:spPr>
+            <a:xfrm>
+              <a:off x="1169643" y="1826398"/>
+              <a:ext cx="3205205" cy="3205205"/>
+            </a:xfrm>
+            <a:prstGeom prst="rect">
+              <a:avLst/>
+            </a:prstGeom>
+            <a:effectLst>
+              <a:outerShdw blurRad="190500" sx="102000" sy="102000" algn="ctr" rotWithShape="0">
+                <a:prstClr val="black">
+                  <a:alpha val="40000"/>
+                </a:prstClr>
+              </a:outerShdw>
+            </a:effectLst>
+          </p:spPr>
+        </p:pic>
+        <p:grpSp>
+          <p:nvGrpSpPr>
+            <p:cNvPr id="11" name="组合 10">
+              <a:extLst>
+                <a:ext uri="{FF2B5EF4-FFF2-40B4-BE49-F238E27FC236}">
+                  <a16:creationId xmlns:a16="http://schemas.microsoft.com/office/drawing/2014/main" id="{B69C46E6-9C94-4C91-0938-550200414F3B}"/>
+                </a:ext>
+              </a:extLst>
+            </p:cNvPr>
+            <p:cNvGrpSpPr/>
+            <p:nvPr/>
+          </p:nvGrpSpPr>
+          <p:grpSpPr>
+            <a:xfrm>
+              <a:off x="4541095" y="1588656"/>
+              <a:ext cx="6481261" cy="3442946"/>
+              <a:chOff x="4257957" y="1616365"/>
+              <a:chExt cx="6481261" cy="3442946"/>
+            </a:xfrm>
+          </p:grpSpPr>
+          <p:sp>
+            <p:nvSpPr>
+              <p:cNvPr id="8" name="文本框 7">
+                <a:extLst>
+                  <a:ext uri="{FF2B5EF4-FFF2-40B4-BE49-F238E27FC236}">
+                    <a16:creationId xmlns:a16="http://schemas.microsoft.com/office/drawing/2014/main" id="{C04EF757-5938-73F9-6E38-A648015B7730}"/>
+                  </a:ext>
+                </a:extLst>
+              </p:cNvPr>
+              <p:cNvSpPr txBox="1"/>
+              <p:nvPr/>
+            </p:nvSpPr>
+            <p:spPr>
+              <a:xfrm>
+                <a:off x="4257957" y="1616365"/>
+                <a:ext cx="6481261" cy="2800767"/>
+              </a:xfrm>
+              <a:prstGeom prst="rect">
+                <a:avLst/>
+              </a:prstGeom>
+              <a:noFill/>
+            </p:spPr>
+            <p:txBody>
+              <a:bodyPr wrap="none" rtlCol="0">
+                <a:spAutoFit/>
+              </a:bodyPr>
+              <a:lstStyle/>
+              <a:p>
+                <a:pPr marL="0" marR="0" lvl="0" indent="0" algn="l" defTabSz="914400" rtl="0" eaLnBrk="1" fontAlgn="auto" latinLnBrk="0" hangingPunct="1">
+                  <a:lnSpc>
+                    <a:spcPct val="100000"/>
+                  </a:lnSpc>
+                  <a:spcBef>
+                    <a:spcPts val="0"/>
+                  </a:spcBef>
+                  <a:spcAft>
+                    <a:spcPts val="0"/>
+                  </a:spcAft>
+                  <a:buClrTx/>
+                  <a:buSzTx/>
+                  <a:buFontTx/>
+                  <a:buNone/>
+                  <a:tabLst/>
+                  <a:defRPr/>
+                </a:pPr>
+                <a:r>
+                  <a:rPr kumimoji="0" lang="en-US" altLang="zh-CN" sz="8800" b="0" i="0" u="none" strike="noStrike" kern="1200" cap="none" spc="0" normalizeH="0" baseline="0" noProof="0" dirty="0">
+                    <a:ln>
+                      <a:noFill/>
+                    </a:ln>
+                    <a:solidFill>
+                      <a:srgbClr val="FF0000"/>
+                    </a:solidFill>
+                    <a:effectLst/>
+                    <a:uLnTx/>
+                    <a:uFillTx/>
+                    <a:latin typeface="微软雅黑 Light" panose="020B0502040204020203" pitchFamily="34" charset="-122"/>
+                    <a:ea typeface="微软雅黑 Light" panose="020B0502040204020203" pitchFamily="34" charset="-122"/>
+                    <a:cs typeface="+mn-cs"/>
+                  </a:rPr>
+                  <a:t>P</a:t>
+                </a:r>
+                <a:r>
+                  <a:rPr kumimoji="0" lang="en-US" altLang="zh-CN" sz="8800" b="0" i="0" u="none" strike="noStrike" kern="1200" cap="none" spc="0" normalizeH="0" baseline="0" noProof="0" dirty="0">
+                    <a:ln>
+                      <a:noFill/>
+                    </a:ln>
+                    <a:solidFill>
+                      <a:prstClr val="black"/>
+                    </a:solidFill>
+                    <a:effectLst/>
+                    <a:uLnTx/>
+                    <a:uFillTx/>
+                    <a:latin typeface="微软雅黑 Light" panose="020B0502040204020203" pitchFamily="34" charset="-122"/>
+                    <a:ea typeface="微软雅黑 Light" panose="020B0502040204020203" pitchFamily="34" charset="-122"/>
+                    <a:cs typeface="+mn-cs"/>
+                  </a:rPr>
+                  <a:t>seudocode</a:t>
+                </a:r>
+              </a:p>
+              <a:p>
+                <a:pPr marL="0" marR="0" lvl="0" indent="0" algn="l" defTabSz="914400" rtl="0" eaLnBrk="1" fontAlgn="auto" latinLnBrk="0" hangingPunct="1">
+                  <a:lnSpc>
+                    <a:spcPct val="100000"/>
+                  </a:lnSpc>
+                  <a:spcBef>
+                    <a:spcPts val="0"/>
+                  </a:spcBef>
+                  <a:spcAft>
+                    <a:spcPts val="0"/>
+                  </a:spcAft>
+                  <a:buClrTx/>
+                  <a:buSzTx/>
+                  <a:buFontTx/>
+                  <a:buNone/>
+                  <a:tabLst/>
+                  <a:defRPr/>
+                </a:pPr>
+                <a:r>
+                  <a:rPr kumimoji="0" lang="en-US" altLang="zh-CN" sz="8800" b="0" i="0" u="none" strike="noStrike" kern="1200" cap="none" spc="0" normalizeH="0" baseline="0" noProof="0" dirty="0">
+                    <a:ln>
+                      <a:noFill/>
+                    </a:ln>
+                    <a:solidFill>
+                      <a:srgbClr val="FF0000"/>
+                    </a:solidFill>
+                    <a:effectLst/>
+                    <a:uLnTx/>
+                    <a:uFillTx/>
+                    <a:latin typeface="微软雅黑 Light" panose="020B0502040204020203" pitchFamily="34" charset="-122"/>
+                    <a:ea typeface="微软雅黑 Light" panose="020B0502040204020203" pitchFamily="34" charset="-122"/>
+                    <a:cs typeface="+mn-cs"/>
+                  </a:rPr>
+                  <a:t>I</a:t>
+                </a:r>
+                <a:r>
+                  <a:rPr kumimoji="0" lang="en-US" altLang="zh-CN" sz="8800" b="0" i="0" u="none" strike="noStrike" kern="1200" cap="none" spc="0" normalizeH="0" baseline="0" noProof="0" dirty="0">
+                    <a:ln>
+                      <a:noFill/>
+                    </a:ln>
+                    <a:solidFill>
+                      <a:prstClr val="black"/>
+                    </a:solidFill>
+                    <a:effectLst/>
+                    <a:uLnTx/>
+                    <a:uFillTx/>
+                    <a:latin typeface="微软雅黑 Light" panose="020B0502040204020203" pitchFamily="34" charset="-122"/>
+                    <a:ea typeface="微软雅黑 Light" panose="020B0502040204020203" pitchFamily="34" charset="-122"/>
+                    <a:cs typeface="+mn-cs"/>
+                  </a:rPr>
+                  <a:t>nterpreter</a:t>
+                </a:r>
+                <a:endParaRPr kumimoji="0" lang="zh-CN" altLang="en-US" sz="8800" b="0" i="0" u="none" strike="noStrike" kern="1200" cap="none" spc="0" normalizeH="0" baseline="0" noProof="0" dirty="0">
+                  <a:ln>
+                    <a:noFill/>
+                  </a:ln>
+                  <a:solidFill>
+                    <a:prstClr val="black"/>
+                  </a:solidFill>
+                  <a:effectLst/>
+                  <a:uLnTx/>
+                  <a:uFillTx/>
+                  <a:latin typeface="微软雅黑 Light" panose="020B0502040204020203" pitchFamily="34" charset="-122"/>
+                  <a:ea typeface="微软雅黑 Light" panose="020B0502040204020203" pitchFamily="34" charset="-122"/>
+                  <a:cs typeface="+mn-cs"/>
+                </a:endParaRPr>
+              </a:p>
+            </p:txBody>
+          </p:sp>
+          <p:sp>
+            <p:nvSpPr>
+              <p:cNvPr id="9" name="矩形 8">
+                <a:extLst>
+                  <a:ext uri="{FF2B5EF4-FFF2-40B4-BE49-F238E27FC236}">
+                    <a16:creationId xmlns:a16="http://schemas.microsoft.com/office/drawing/2014/main" id="{A399E17B-3EE7-70F0-83AE-0627FA4E99DE}"/>
+                  </a:ext>
+                </a:extLst>
+              </p:cNvPr>
+              <p:cNvSpPr/>
+              <p:nvPr/>
+            </p:nvSpPr>
+            <p:spPr>
+              <a:xfrm>
+                <a:off x="4341092" y="4488873"/>
+                <a:ext cx="6398126" cy="570438"/>
+              </a:xfrm>
+              <a:prstGeom prst="rect">
+                <a:avLst/>
+              </a:prstGeom>
+              <a:solidFill>
+                <a:schemeClr val="accent4">
+                  <a:lumMod val="20000"/>
+                  <a:lumOff val="80000"/>
+                </a:schemeClr>
+              </a:solidFill>
+              <a:ln>
+                <a:noFill/>
+              </a:ln>
+            </p:spPr>
+            <p:style>
+              <a:lnRef idx="2">
+                <a:schemeClr val="accent1">
+                  <a:shade val="50000"/>
+                </a:schemeClr>
+              </a:lnRef>
+              <a:fillRef idx="1">
+                <a:schemeClr val="accent1"/>
+              </a:fillRef>
+              <a:effectRef idx="0">
+                <a:schemeClr val="accent1"/>
+              </a:effectRef>
+              <a:fontRef idx="minor">
+                <a:schemeClr val="lt1"/>
+              </a:fontRef>
+            </p:style>
+            <p:txBody>
+              <a:bodyPr rtlCol="0" anchor="ctr"/>
+              <a:lstStyle/>
+              <a:p>
+                <a:pPr marL="0" marR="0" lvl="0" indent="0" algn="l" defTabSz="914400" rtl="0" eaLnBrk="1" fontAlgn="auto" latinLnBrk="0" hangingPunct="1">
+                  <a:lnSpc>
+                    <a:spcPts val="3000"/>
+                  </a:lnSpc>
+                  <a:spcBef>
+                    <a:spcPts val="0"/>
+                  </a:spcBef>
+                  <a:spcAft>
+                    <a:spcPts val="0"/>
+                  </a:spcAft>
+                  <a:buClrTx/>
+                  <a:buSzTx/>
+                  <a:buFontTx/>
+                  <a:buNone/>
+                  <a:tabLst/>
+                  <a:defRPr/>
+                </a:pPr>
+                <a:r>
+                  <a:rPr kumimoji="0" lang="en-US" altLang="zh-CN" sz="2400" b="0" i="0" u="none" strike="noStrike" kern="1200" cap="none" spc="0" normalizeH="0" baseline="0" noProof="0" dirty="0">
+                    <a:ln>
+                      <a:noFill/>
+                    </a:ln>
+                    <a:solidFill>
+                      <a:prstClr val="black"/>
+                    </a:solidFill>
+                    <a:effectLst/>
+                    <a:uLnTx/>
+                    <a:uFillTx/>
+                    <a:latin typeface="等线 Light" panose="02010600030101010101" pitchFamily="2" charset="-122"/>
+                    <a:ea typeface="等线 Light" panose="02010600030101010101" pitchFamily="2" charset="-122"/>
+                    <a:cs typeface="+mn-cs"/>
+                  </a:rPr>
+                  <a:t>                       Alpha testing of the IDE</a:t>
+                </a:r>
+                <a:endParaRPr kumimoji="0" lang="zh-CN" altLang="en-US" sz="2800" b="0" i="0" u="none" strike="noStrike" kern="1200" cap="none" spc="0" normalizeH="0" baseline="0" noProof="0" dirty="0">
+                  <a:ln>
+                    <a:noFill/>
+                  </a:ln>
+                  <a:solidFill>
+                    <a:prstClr val="black"/>
+                  </a:solidFill>
+                  <a:effectLst/>
+                  <a:uLnTx/>
+                  <a:uFillTx/>
+                  <a:latin typeface="等线 Light" panose="02010600030101010101" pitchFamily="2" charset="-122"/>
+                  <a:ea typeface="等线 Light" panose="02010600030101010101" pitchFamily="2" charset="-122"/>
+                  <a:cs typeface="+mn-cs"/>
+                </a:endParaRPr>
+              </a:p>
+            </p:txBody>
+          </p:sp>
+          <p:sp>
+            <p:nvSpPr>
+              <p:cNvPr id="10" name="箭头: 五边形 9">
+                <a:extLst>
+                  <a:ext uri="{FF2B5EF4-FFF2-40B4-BE49-F238E27FC236}">
+                    <a16:creationId xmlns:a16="http://schemas.microsoft.com/office/drawing/2014/main" id="{399EC284-046B-9279-CB34-FA0E88CB07B1}"/>
+                  </a:ext>
+                </a:extLst>
+              </p:cNvPr>
+              <p:cNvSpPr/>
+              <p:nvPr/>
+            </p:nvSpPr>
+            <p:spPr>
+              <a:xfrm>
+                <a:off x="4341091" y="4488873"/>
+                <a:ext cx="1874982" cy="570437"/>
+              </a:xfrm>
+              <a:prstGeom prst="homePlate">
+                <a:avLst/>
+              </a:prstGeom>
+              <a:solidFill>
+                <a:schemeClr val="accent2">
+                  <a:lumMod val="60000"/>
+                  <a:lumOff val="40000"/>
+                </a:schemeClr>
+              </a:solidFill>
+              <a:ln>
+                <a:noFill/>
+              </a:ln>
+            </p:spPr>
+            <p:style>
+              <a:lnRef idx="2">
+                <a:schemeClr val="accent1">
+                  <a:shade val="50000"/>
+                </a:schemeClr>
+              </a:lnRef>
+              <a:fillRef idx="1">
+                <a:schemeClr val="accent1"/>
+              </a:fillRef>
+              <a:effectRef idx="0">
+                <a:schemeClr val="accent1"/>
+              </a:effectRef>
+              <a:fontRef idx="minor">
+                <a:schemeClr val="lt1"/>
+              </a:fontRef>
+            </p:style>
+            <p:txBody>
+              <a:bodyPr rtlCol="0" anchor="ctr"/>
+              <a:lstStyle/>
+              <a:p>
+                <a:pPr marL="0" marR="0" lvl="0" indent="0" algn="ctr" defTabSz="914400" rtl="0" eaLnBrk="1" fontAlgn="auto" latinLnBrk="0" hangingPunct="1">
+                  <a:lnSpc>
+                    <a:spcPct val="100000"/>
+                  </a:lnSpc>
+                  <a:spcBef>
+                    <a:spcPts val="0"/>
+                  </a:spcBef>
+                  <a:spcAft>
+                    <a:spcPts val="0"/>
+                  </a:spcAft>
+                  <a:buClrTx/>
+                  <a:buSzTx/>
+                  <a:buFontTx/>
+                  <a:buNone/>
+                  <a:tabLst/>
+                  <a:defRPr/>
+                </a:pPr>
+                <a:r>
+                  <a:rPr kumimoji="0" lang="en-US" altLang="zh-CN" sz="2400" b="0" i="0" u="none" strike="noStrike" kern="1200" cap="none" spc="0" normalizeH="0" baseline="0" noProof="0" dirty="0">
+                    <a:ln>
+                      <a:noFill/>
+                    </a:ln>
+                    <a:solidFill>
+                      <a:srgbClr val="7030A0"/>
+                    </a:solidFill>
+                    <a:effectLst/>
+                    <a:uLnTx/>
+                    <a:uFillTx/>
+                    <a:latin typeface="微软雅黑" panose="020B0503020204020204" pitchFamily="34" charset="-122"/>
+                    <a:ea typeface="微软雅黑" panose="020B0503020204020204" pitchFamily="34" charset="-122"/>
+                    <a:cs typeface="+mn-cs"/>
+                  </a:rPr>
+                  <a:t>PHASE </a:t>
+                </a:r>
+                <a:r>
+                  <a:rPr lang="en-US" altLang="zh-CN" sz="2400" dirty="0">
+                    <a:solidFill>
+                      <a:srgbClr val="7030A0"/>
+                    </a:solidFill>
+                    <a:latin typeface="微软雅黑" panose="020B0503020204020204" pitchFamily="34" charset="-122"/>
+                    <a:ea typeface="微软雅黑" panose="020B0503020204020204" pitchFamily="34" charset="-122"/>
+                  </a:rPr>
+                  <a:t>02</a:t>
+                </a:r>
+                <a:endParaRPr kumimoji="0" lang="zh-CN" altLang="en-US" sz="2400" b="0" i="0" u="none" strike="noStrike" kern="1200" cap="none" spc="0" normalizeH="0" baseline="0" noProof="0" dirty="0">
+                  <a:ln>
+                    <a:noFill/>
+                  </a:ln>
+                  <a:solidFill>
+                    <a:srgbClr val="7030A0"/>
+                  </a:solidFill>
+                  <a:effectLst/>
+                  <a:uLnTx/>
+                  <a:uFillTx/>
+                  <a:latin typeface="微软雅黑" panose="020B0503020204020204" pitchFamily="34" charset="-122"/>
+                  <a:ea typeface="微软雅黑" panose="020B0503020204020204" pitchFamily="34" charset="-122"/>
+                  <a:cs typeface="+mn-cs"/>
+                </a:endParaRPr>
+              </a:p>
+            </p:txBody>
+          </p:sp>
+        </p:grpSp>
+      </p:grpSp>
+    </p:spTree>
+    <p:extLst>
+      <p:ext uri="{BB962C8B-B14F-4D97-AF65-F5344CB8AC3E}">
+        <p14:creationId xmlns:p14="http://schemas.microsoft.com/office/powerpoint/2010/main" val="2094594516"/>
+      </p:ext>
+    </p:extLst>
+  </p:cSld>
+  <p:clrMapOvr>
+    <a:masterClrMapping/>
+  </p:clrMapOvr>
+</p:sld>
+</file>
+
+<file path=ppt/slides/slide3.xml><?xml version="1.0" encoding="utf-8"?>
+<p:sld xmlns:a="http://schemas.openxmlformats.org/drawingml/2006/main" xmlns:r="http://schemas.openxmlformats.org/officeDocument/2006/relationships" xmlns:p="http://schemas.openxmlformats.org/presentationml/2006/main">
+  <p:cSld>
+    <p:bg>
+      <p:bgPr>
+        <a:solidFill>
+          <a:schemeClr val="bg2"/>
+        </a:solidFill>
+        <a:effectLst/>
+      </p:bgPr>
+    </p:bg>
+    <p:spTree>
+      <p:nvGrpSpPr>
+        <p:cNvPr id="1" name=""/>
+        <p:cNvGrpSpPr/>
+        <p:nvPr/>
+      </p:nvGrpSpPr>
+      <p:grpSpPr>
+        <a:xfrm>
+          <a:off x="0" y="0"/>
+          <a:ext cx="0" cy="0"/>
+          <a:chOff x="0" y="0"/>
+          <a:chExt cx="0" cy="0"/>
+        </a:xfrm>
+      </p:grpSpPr>
+      <p:grpSp>
+        <p:nvGrpSpPr>
+          <p:cNvPr id="4" name="组合 3">
+            <a:extLst>
+              <a:ext uri="{FF2B5EF4-FFF2-40B4-BE49-F238E27FC236}">
+                <a16:creationId xmlns:a16="http://schemas.microsoft.com/office/drawing/2014/main" id="{B066532D-BECE-0DC9-7BAF-A87DB555866B}"/>
+              </a:ext>
+            </a:extLst>
+          </p:cNvPr>
+          <p:cNvGrpSpPr/>
+          <p:nvPr/>
+        </p:nvGrpSpPr>
+        <p:grpSpPr>
+          <a:xfrm>
+            <a:off x="620325" y="1914500"/>
+            <a:ext cx="6563675" cy="3029000"/>
+            <a:chOff x="648034" y="1745673"/>
+            <a:chExt cx="6563675" cy="3029000"/>
+          </a:xfrm>
+        </p:grpSpPr>
+        <p:grpSp>
+          <p:nvGrpSpPr>
+            <p:cNvPr id="14" name="组合 13">
+              <a:extLst>
+                <a:ext uri="{FF2B5EF4-FFF2-40B4-BE49-F238E27FC236}">
+                  <a16:creationId xmlns:a16="http://schemas.microsoft.com/office/drawing/2014/main" id="{CFB24489-5300-69E3-F669-5B9D13DA49E5}"/>
+                </a:ext>
+              </a:extLst>
+            </p:cNvPr>
+            <p:cNvGrpSpPr/>
+            <p:nvPr/>
+          </p:nvGrpSpPr>
+          <p:grpSpPr>
+            <a:xfrm>
+              <a:off x="768508" y="2729873"/>
+              <a:ext cx="6443201" cy="2044800"/>
+              <a:chOff x="1927025" y="911998"/>
+              <a:chExt cx="6938063" cy="2341506"/>
+            </a:xfrm>
+          </p:grpSpPr>
+          <p:pic>
+            <p:nvPicPr>
+              <p:cNvPr id="13" name="图片 12" descr="徽标&#10;&#10;描述已自动生成">
+                <a:extLst>
+                  <a:ext uri="{FF2B5EF4-FFF2-40B4-BE49-F238E27FC236}">
+                    <a16:creationId xmlns:a16="http://schemas.microsoft.com/office/drawing/2014/main" id="{AB553BBC-8AD6-F74D-EC32-30E7D3CAF8CD}"/>
+                  </a:ext>
+                </a:extLst>
+              </p:cNvPr>
+              <p:cNvPicPr>
+                <a:picLocks noChangeAspect="1"/>
+              </p:cNvPicPr>
+              <p:nvPr/>
+            </p:nvPicPr>
+            <p:blipFill>
+              <a:blip r:embed="rId2">
+                <a:extLst>
+                  <a:ext uri="{28A0092B-C50C-407E-A947-70E740481C1C}">
+                    <a14:useLocalDpi xmlns:a14="http://schemas.microsoft.com/office/drawing/2010/main" val="0"/>
+                  </a:ext>
+                </a:extLst>
+              </a:blip>
+              <a:stretch>
+                <a:fillRect/>
+              </a:stretch>
+            </p:blipFill>
+            <p:spPr>
+              <a:xfrm>
+                <a:off x="1927025" y="911998"/>
+                <a:ext cx="2201848" cy="2341506"/>
+              </a:xfrm>
+              <a:prstGeom prst="rect">
+                <a:avLst/>
+              </a:prstGeom>
+              <a:effectLst>
+                <a:outerShdw blurRad="190500" sx="102000" sy="102000" algn="ctr" rotWithShape="0">
+                  <a:prstClr val="black">
+                    <a:alpha val="40000"/>
+                  </a:prstClr>
+                </a:outerShdw>
+              </a:effectLst>
+            </p:spPr>
+          </p:pic>
+          <p:sp>
+            <p:nvSpPr>
+              <p:cNvPr id="8" name="文本框 7">
+                <a:extLst>
+                  <a:ext uri="{FF2B5EF4-FFF2-40B4-BE49-F238E27FC236}">
+                    <a16:creationId xmlns:a16="http://schemas.microsoft.com/office/drawing/2014/main" id="{C04EF757-5938-73F9-6E38-A648015B7730}"/>
+                  </a:ext>
+                </a:extLst>
+              </p:cNvPr>
+              <p:cNvSpPr txBox="1"/>
+              <p:nvPr/>
+            </p:nvSpPr>
+            <p:spPr>
+              <a:xfrm>
+                <a:off x="4506291" y="1078309"/>
+                <a:ext cx="4358797" cy="2008883"/>
+              </a:xfrm>
+              <a:prstGeom prst="rect">
+                <a:avLst/>
+              </a:prstGeom>
+              <a:noFill/>
+            </p:spPr>
+            <p:txBody>
+              <a:bodyPr wrap="none" rtlCol="0">
+                <a:spAutoFit/>
+              </a:bodyPr>
+              <a:lstStyle/>
+              <a:p>
+                <a:pPr marL="0" marR="0" lvl="0" indent="0" algn="l" defTabSz="914400" rtl="0" eaLnBrk="1" fontAlgn="auto" latinLnBrk="0" hangingPunct="1">
+                  <a:lnSpc>
+                    <a:spcPct val="100000"/>
+                  </a:lnSpc>
+                  <a:spcBef>
+                    <a:spcPts val="0"/>
+                  </a:spcBef>
+                  <a:spcAft>
+                    <a:spcPts val="0"/>
+                  </a:spcAft>
+                  <a:buClrTx/>
+                  <a:buSzTx/>
+                  <a:buFontTx/>
+                  <a:buNone/>
+                  <a:tabLst/>
+                  <a:defRPr/>
+                </a:pPr>
+                <a:r>
+                  <a:rPr kumimoji="0" lang="en-US" altLang="zh-CN" sz="5400" b="0" i="0" u="none" strike="noStrike" kern="1200" cap="none" spc="0" normalizeH="0" baseline="0" noProof="0" dirty="0">
+                    <a:ln>
+                      <a:noFill/>
+                    </a:ln>
+                    <a:solidFill>
+                      <a:srgbClr val="FF0000"/>
+                    </a:solidFill>
+                    <a:effectLst/>
+                    <a:uLnTx/>
+                    <a:uFillTx/>
+                    <a:latin typeface="微软雅黑 Light" panose="020B0502040204020203" pitchFamily="34" charset="-122"/>
+                    <a:ea typeface="微软雅黑 Light" panose="020B0502040204020203" pitchFamily="34" charset="-122"/>
+                    <a:cs typeface="+mn-cs"/>
+                  </a:rPr>
+                  <a:t>P</a:t>
+                </a:r>
+                <a:r>
+                  <a:rPr kumimoji="0" lang="en-US" altLang="zh-CN" sz="5400" b="0" i="0" u="none" strike="noStrike" kern="1200" cap="none" spc="0" normalizeH="0" baseline="0" noProof="0" dirty="0">
+                    <a:ln>
+                      <a:noFill/>
+                    </a:ln>
+                    <a:solidFill>
+                      <a:prstClr val="black"/>
+                    </a:solidFill>
+                    <a:effectLst/>
+                    <a:uLnTx/>
+                    <a:uFillTx/>
+                    <a:latin typeface="微软雅黑 Light" panose="020B0502040204020203" pitchFamily="34" charset="-122"/>
+                    <a:ea typeface="微软雅黑 Light" panose="020B0502040204020203" pitchFamily="34" charset="-122"/>
+                    <a:cs typeface="+mn-cs"/>
+                  </a:rPr>
+                  <a:t>seudocode</a:t>
+                </a:r>
+              </a:p>
+              <a:p>
+                <a:pPr marL="0" marR="0" lvl="0" indent="0" algn="l" defTabSz="914400" rtl="0" eaLnBrk="1" fontAlgn="auto" latinLnBrk="0" hangingPunct="1">
+                  <a:lnSpc>
+                    <a:spcPct val="100000"/>
+                  </a:lnSpc>
+                  <a:spcBef>
+                    <a:spcPts val="0"/>
+                  </a:spcBef>
+                  <a:spcAft>
+                    <a:spcPts val="0"/>
+                  </a:spcAft>
+                  <a:buClrTx/>
+                  <a:buSzTx/>
+                  <a:buFontTx/>
+                  <a:buNone/>
+                  <a:tabLst/>
+                  <a:defRPr/>
+                </a:pPr>
+                <a:r>
+                  <a:rPr kumimoji="0" lang="en-US" altLang="zh-CN" sz="5400" b="0" i="0" u="none" strike="noStrike" kern="1200" cap="none" spc="0" normalizeH="0" baseline="0" noProof="0" dirty="0">
+                    <a:ln>
+                      <a:noFill/>
+                    </a:ln>
+                    <a:solidFill>
+                      <a:srgbClr val="FF0000"/>
+                    </a:solidFill>
+                    <a:effectLst/>
+                    <a:uLnTx/>
+                    <a:uFillTx/>
+                    <a:latin typeface="微软雅黑 Light" panose="020B0502040204020203" pitchFamily="34" charset="-122"/>
+                    <a:ea typeface="微软雅黑 Light" panose="020B0502040204020203" pitchFamily="34" charset="-122"/>
+                    <a:cs typeface="+mn-cs"/>
+                  </a:rPr>
+                  <a:t>I</a:t>
+                </a:r>
+                <a:r>
+                  <a:rPr kumimoji="0" lang="en-US" altLang="zh-CN" sz="5400" b="0" i="0" u="none" strike="noStrike" kern="1200" cap="none" spc="0" normalizeH="0" baseline="0" noProof="0" dirty="0">
+                    <a:ln>
+                      <a:noFill/>
+                    </a:ln>
+                    <a:solidFill>
+                      <a:prstClr val="black"/>
+                    </a:solidFill>
+                    <a:effectLst/>
+                    <a:uLnTx/>
+                    <a:uFillTx/>
+                    <a:latin typeface="微软雅黑 Light" panose="020B0502040204020203" pitchFamily="34" charset="-122"/>
+                    <a:ea typeface="微软雅黑 Light" panose="020B0502040204020203" pitchFamily="34" charset="-122"/>
+                    <a:cs typeface="+mn-cs"/>
+                  </a:rPr>
+                  <a:t>nterpreter</a:t>
+                </a:r>
+                <a:endParaRPr kumimoji="0" lang="zh-CN" altLang="en-US" sz="5400" b="0" i="0" u="none" strike="noStrike" kern="1200" cap="none" spc="0" normalizeH="0" baseline="0" noProof="0" dirty="0">
+                  <a:ln>
+                    <a:noFill/>
+                  </a:ln>
+                  <a:solidFill>
+                    <a:prstClr val="black"/>
+                  </a:solidFill>
+                  <a:effectLst/>
+                  <a:uLnTx/>
+                  <a:uFillTx/>
+                  <a:latin typeface="微软雅黑 Light" panose="020B0502040204020203" pitchFamily="34" charset="-122"/>
+                  <a:ea typeface="微软雅黑 Light" panose="020B0502040204020203" pitchFamily="34" charset="-122"/>
+                  <a:cs typeface="+mn-cs"/>
+                </a:endParaRPr>
+              </a:p>
+            </p:txBody>
+          </p:sp>
+        </p:grpSp>
+        <p:sp>
+          <p:nvSpPr>
+            <p:cNvPr id="2" name="文本框 1">
+              <a:extLst>
+                <a:ext uri="{FF2B5EF4-FFF2-40B4-BE49-F238E27FC236}">
+                  <a16:creationId xmlns:a16="http://schemas.microsoft.com/office/drawing/2014/main" id="{9826F35A-D9CB-7762-8632-DB41DB84C8E3}"/>
+                </a:ext>
+              </a:extLst>
+            </p:cNvPr>
+            <p:cNvSpPr txBox="1"/>
+            <p:nvPr/>
+          </p:nvSpPr>
+          <p:spPr>
+            <a:xfrm>
+              <a:off x="648034" y="1745673"/>
+              <a:ext cx="4475071" cy="584775"/>
+            </a:xfrm>
+            <a:prstGeom prst="rect">
+              <a:avLst/>
+            </a:prstGeom>
+            <a:noFill/>
+          </p:spPr>
+          <p:txBody>
+            <a:bodyPr wrap="none" rtlCol="0">
+              <a:spAutoFit/>
+            </a:bodyPr>
+            <a:lstStyle/>
+            <a:p>
+              <a:r>
+                <a:rPr lang="en-US" altLang="zh-CN" sz="3200" dirty="0">
+                  <a:solidFill>
+                    <a:schemeClr val="tx1">
+                      <a:lumMod val="75000"/>
+                      <a:lumOff val="25000"/>
+                    </a:schemeClr>
+                  </a:solidFill>
+                  <a:latin typeface="微软雅黑 Light" panose="020B0502040204020203" pitchFamily="34" charset="-122"/>
+                  <a:ea typeface="微软雅黑 Light" panose="020B0502040204020203" pitchFamily="34" charset="-122"/>
+                </a:rPr>
+                <a:t>Release Conference for</a:t>
+              </a:r>
+              <a:endParaRPr lang="zh-CN" altLang="en-US" sz="3200" dirty="0">
+                <a:solidFill>
+                  <a:schemeClr val="tx1">
+                    <a:lumMod val="75000"/>
+                    <a:lumOff val="25000"/>
+                  </a:schemeClr>
+                </a:solidFill>
+                <a:latin typeface="微软雅黑 Light" panose="020B0502040204020203" pitchFamily="34" charset="-122"/>
+                <a:ea typeface="微软雅黑 Light" panose="020B0502040204020203" pitchFamily="34" charset="-122"/>
+              </a:endParaRPr>
+            </a:p>
+          </p:txBody>
+        </p:sp>
+      </p:grpSp>
+      <p:sp>
+        <p:nvSpPr>
+          <p:cNvPr id="5" name="文本框 4">
+            <a:extLst>
+              <a:ext uri="{FF2B5EF4-FFF2-40B4-BE49-F238E27FC236}">
+                <a16:creationId xmlns:a16="http://schemas.microsoft.com/office/drawing/2014/main" id="{F185A681-09BC-236A-1C54-43A4E142B957}"/>
+              </a:ext>
+            </a:extLst>
+          </p:cNvPr>
+          <p:cNvSpPr txBox="1"/>
+          <p:nvPr/>
+        </p:nvSpPr>
+        <p:spPr>
+          <a:xfrm>
+            <a:off x="7943382" y="1166842"/>
+            <a:ext cx="3779564" cy="4524315"/>
+          </a:xfrm>
+          <a:prstGeom prst="rect">
+            <a:avLst/>
+          </a:prstGeom>
+          <a:noFill/>
+        </p:spPr>
+        <p:txBody>
+          <a:bodyPr wrap="square" rtlCol="0">
+            <a:spAutoFit/>
+          </a:bodyPr>
+          <a:lstStyle/>
+          <a:p>
+            <a:r>
+              <a:rPr lang="en-US" altLang="zh-CN" sz="3200" dirty="0">
+                <a:solidFill>
+                  <a:srgbClr val="FF0000"/>
+                </a:solidFill>
+                <a:latin typeface="微软雅黑 Light" panose="020B0502040204020203" pitchFamily="34" charset="-122"/>
+                <a:ea typeface="微软雅黑 Light" panose="020B0502040204020203" pitchFamily="34" charset="-122"/>
+              </a:rPr>
+              <a:t>Presenter:</a:t>
+            </a:r>
+          </a:p>
+          <a:p>
+            <a:r>
+              <a:rPr lang="en-US" altLang="zh-CN" sz="3200" dirty="0">
+                <a:solidFill>
+                  <a:schemeClr val="tx1">
+                    <a:lumMod val="75000"/>
+                    <a:lumOff val="25000"/>
+                  </a:schemeClr>
+                </a:solidFill>
+                <a:latin typeface="微软雅黑 Light" panose="020B0502040204020203" pitchFamily="34" charset="-122"/>
+                <a:ea typeface="微软雅黑 Light" panose="020B0502040204020203" pitchFamily="34" charset="-122"/>
+              </a:rPr>
+              <a:t>A22 Zik</a:t>
+            </a:r>
+          </a:p>
+          <a:p>
+            <a:endParaRPr lang="en-US" altLang="zh-CN" sz="3200" dirty="0">
+              <a:solidFill>
+                <a:schemeClr val="tx1">
+                  <a:lumMod val="75000"/>
+                  <a:lumOff val="25000"/>
+                </a:schemeClr>
+              </a:solidFill>
+              <a:latin typeface="微软雅黑 Light" panose="020B0502040204020203" pitchFamily="34" charset="-122"/>
+              <a:ea typeface="微软雅黑 Light" panose="020B0502040204020203" pitchFamily="34" charset="-122"/>
+            </a:endParaRPr>
+          </a:p>
+          <a:p>
+            <a:r>
+              <a:rPr lang="en-US" altLang="zh-CN" sz="3200" dirty="0">
+                <a:solidFill>
+                  <a:srgbClr val="FF0000"/>
+                </a:solidFill>
+                <a:latin typeface="微软雅黑 Light" panose="020B0502040204020203" pitchFamily="34" charset="-122"/>
+                <a:ea typeface="微软雅黑 Light" panose="020B0502040204020203" pitchFamily="34" charset="-122"/>
+              </a:rPr>
+              <a:t>Date:</a:t>
+            </a:r>
+          </a:p>
+          <a:p>
+            <a:r>
+              <a:rPr lang="en-US" altLang="zh-CN" sz="3200" dirty="0">
+                <a:solidFill>
+                  <a:schemeClr val="tx1">
+                    <a:lumMod val="75000"/>
+                    <a:lumOff val="25000"/>
+                  </a:schemeClr>
+                </a:solidFill>
+                <a:latin typeface="微软雅黑 Light" panose="020B0502040204020203" pitchFamily="34" charset="-122"/>
+                <a:ea typeface="微软雅黑 Light" panose="020B0502040204020203" pitchFamily="34" charset="-122"/>
+              </a:rPr>
+              <a:t>1</a:t>
+            </a:r>
+            <a:r>
+              <a:rPr lang="en-US" altLang="zh-CN" sz="3200" baseline="30000" dirty="0">
+                <a:solidFill>
+                  <a:schemeClr val="tx1">
+                    <a:lumMod val="75000"/>
+                    <a:lumOff val="25000"/>
+                  </a:schemeClr>
+                </a:solidFill>
+                <a:latin typeface="微软雅黑 Light" panose="020B0502040204020203" pitchFamily="34" charset="-122"/>
+                <a:ea typeface="微软雅黑 Light" panose="020B0502040204020203" pitchFamily="34" charset="-122"/>
+              </a:rPr>
+              <a:t>st</a:t>
+            </a:r>
+            <a:r>
+              <a:rPr lang="en-US" altLang="zh-CN" sz="3200" dirty="0">
+                <a:solidFill>
+                  <a:schemeClr val="tx1">
+                    <a:lumMod val="75000"/>
+                    <a:lumOff val="25000"/>
+                  </a:schemeClr>
+                </a:solidFill>
+                <a:latin typeface="微软雅黑 Light" panose="020B0502040204020203" pitchFamily="34" charset="-122"/>
+                <a:ea typeface="微软雅黑 Light" panose="020B0502040204020203" pitchFamily="34" charset="-122"/>
+              </a:rPr>
+              <a:t> June (Thursday)</a:t>
+            </a:r>
+          </a:p>
+          <a:p>
+            <a:endParaRPr lang="en-US" altLang="zh-CN" sz="3200" dirty="0">
+              <a:solidFill>
+                <a:schemeClr val="tx1">
+                  <a:lumMod val="75000"/>
+                  <a:lumOff val="25000"/>
+                </a:schemeClr>
+              </a:solidFill>
+              <a:latin typeface="微软雅黑 Light" panose="020B0502040204020203" pitchFamily="34" charset="-122"/>
+              <a:ea typeface="微软雅黑 Light" panose="020B0502040204020203" pitchFamily="34" charset="-122"/>
+            </a:endParaRPr>
+          </a:p>
+          <a:p>
+            <a:r>
+              <a:rPr lang="en-US" altLang="zh-CN" sz="3200" dirty="0">
+                <a:solidFill>
+                  <a:srgbClr val="FF0000"/>
+                </a:solidFill>
+                <a:latin typeface="微软雅黑 Light" panose="020B0502040204020203" pitchFamily="34" charset="-122"/>
+                <a:ea typeface="微软雅黑 Light" panose="020B0502040204020203" pitchFamily="34" charset="-122"/>
+              </a:rPr>
+              <a:t>Location:</a:t>
+            </a:r>
+          </a:p>
+          <a:p>
+            <a:r>
+              <a:rPr lang="en-US" altLang="zh-CN" sz="3200" dirty="0">
+                <a:solidFill>
+                  <a:schemeClr val="tx1">
+                    <a:lumMod val="75000"/>
+                    <a:lumOff val="25000"/>
+                  </a:schemeClr>
+                </a:solidFill>
+                <a:latin typeface="微软雅黑 Light" panose="020B0502040204020203" pitchFamily="34" charset="-122"/>
+                <a:ea typeface="微软雅黑 Light" panose="020B0502040204020203" pitchFamily="34" charset="-122"/>
+              </a:rPr>
+              <a:t>Multimedia Conference Room</a:t>
+            </a:r>
+            <a:endParaRPr lang="zh-CN" altLang="en-US" sz="3200" dirty="0">
+              <a:solidFill>
+                <a:schemeClr val="tx1">
+                  <a:lumMod val="75000"/>
+                  <a:lumOff val="25000"/>
+                </a:schemeClr>
+              </a:solidFill>
+              <a:latin typeface="微软雅黑 Light" panose="020B0502040204020203" pitchFamily="34" charset="-122"/>
+              <a:ea typeface="微软雅黑 Light" panose="020B0502040204020203" pitchFamily="34" charset="-122"/>
+            </a:endParaRPr>
+          </a:p>
+        </p:txBody>
+      </p:sp>
+    </p:spTree>
+    <p:extLst>
+      <p:ext uri="{BB962C8B-B14F-4D97-AF65-F5344CB8AC3E}">
+        <p14:creationId xmlns:p14="http://schemas.microsoft.com/office/powerpoint/2010/main" val="456294878"/>
+      </p:ext>
+    </p:extLst>
+  </p:cSld>
+  <p:clrMapOvr>
+    <a:masterClrMapping/>
+  </p:clrMapOvr>
+</p:sld>
+</file>
+
 <file path=ppt/theme/theme1.xml><?xml version="1.0" encoding="utf-8"?>
 <a:theme xmlns:a="http://schemas.openxmlformats.org/drawingml/2006/main" name="Office 主题​​">
   <a:themeElements>

</xml_diff>

<commit_message>
final edition of version 1.0
</commit_message>
<xml_diff>
--- a/开发相关文档.pptx
+++ b/开发相关文档.pptx
@@ -130,16 +130,24 @@
   <pc:docChgLst>
     <pc:chgData name="赵 柘楷" userId="dac37f91-8d7e-4e9e-af67-31d1ff408659" providerId="ADAL" clId="{54D8F212-525F-4A08-AFA3-A94259C05EBD}"/>
     <pc:docChg chg="undo custSel addSld delSld modSld">
-      <pc:chgData name="赵 柘楷" userId="dac37f91-8d7e-4e9e-af67-31d1ff408659" providerId="ADAL" clId="{54D8F212-525F-4A08-AFA3-A94259C05EBD}" dt="2023-05-24T11:31:31.345" v="601" actId="20577"/>
+      <pc:chgData name="赵 柘楷" userId="dac37f91-8d7e-4e9e-af67-31d1ff408659" providerId="ADAL" clId="{54D8F212-525F-4A08-AFA3-A94259C05EBD}" dt="2023-06-07T00:45:06.079" v="603" actId="478"/>
       <pc:docMkLst>
         <pc:docMk/>
       </pc:docMkLst>
-      <pc:sldChg chg="addSp delSp">
-        <pc:chgData name="赵 柘楷" userId="dac37f91-8d7e-4e9e-af67-31d1ff408659" providerId="ADAL" clId="{54D8F212-525F-4A08-AFA3-A94259C05EBD}" dt="2023-04-29T14:50:01.923" v="3"/>
+      <pc:sldChg chg="addSp delSp modSp mod">
+        <pc:chgData name="赵 柘楷" userId="dac37f91-8d7e-4e9e-af67-31d1ff408659" providerId="ADAL" clId="{54D8F212-525F-4A08-AFA3-A94259C05EBD}" dt="2023-06-07T00:45:06.079" v="603" actId="478"/>
         <pc:sldMkLst>
           <pc:docMk/>
           <pc:sldMk cId="2948107791" sldId="256"/>
         </pc:sldMkLst>
+        <pc:picChg chg="add del mod">
+          <ac:chgData name="赵 柘楷" userId="dac37f91-8d7e-4e9e-af67-31d1ff408659" providerId="ADAL" clId="{54D8F212-525F-4A08-AFA3-A94259C05EBD}" dt="2023-06-07T00:45:06.079" v="603" actId="478"/>
+          <ac:picMkLst>
+            <pc:docMk/>
+            <pc:sldMk cId="2948107791" sldId="256"/>
+            <ac:picMk id="2" creationId="{C3892E9E-6497-AAF0-DAA0-E094CE317C05}"/>
+          </ac:picMkLst>
+        </pc:picChg>
         <pc:picChg chg="add del">
           <ac:chgData name="赵 柘楷" userId="dac37f91-8d7e-4e9e-af67-31d1ff408659" providerId="ADAL" clId="{54D8F212-525F-4A08-AFA3-A94259C05EBD}" dt="2023-04-29T14:50:01.923" v="3"/>
           <ac:picMkLst>
@@ -618,7 +626,7 @@
           <a:p>
             <a:fld id="{86A04BA7-A2BA-48C9-87E4-E55ACB6E1DE8}" type="datetimeFigureOut">
               <a:rPr lang="zh-CN" altLang="en-US" smtClean="0"/>
-              <a:t>2023/5/24</a:t>
+              <a:t>2023/6/7</a:t>
             </a:fld>
             <a:endParaRPr lang="zh-CN" altLang="en-US"/>
           </a:p>
@@ -1176,7 +1184,7 @@
           <a:p>
             <a:fld id="{C0956A83-B036-4B96-AF66-88CDD33BBE5A}" type="datetimeFigureOut">
               <a:rPr lang="zh-CN" altLang="en-US" smtClean="0"/>
-              <a:t>2023/5/24</a:t>
+              <a:t>2023/6/7</a:t>
             </a:fld>
             <a:endParaRPr lang="zh-CN" altLang="en-US"/>
           </a:p>
@@ -1374,7 +1382,7 @@
           <a:p>
             <a:fld id="{C0956A83-B036-4B96-AF66-88CDD33BBE5A}" type="datetimeFigureOut">
               <a:rPr lang="zh-CN" altLang="en-US" smtClean="0"/>
-              <a:t>2023/5/24</a:t>
+              <a:t>2023/6/7</a:t>
             </a:fld>
             <a:endParaRPr lang="zh-CN" altLang="en-US"/>
           </a:p>
@@ -1582,7 +1590,7 @@
           <a:p>
             <a:fld id="{C0956A83-B036-4B96-AF66-88CDD33BBE5A}" type="datetimeFigureOut">
               <a:rPr lang="zh-CN" altLang="en-US" smtClean="0"/>
-              <a:t>2023/5/24</a:t>
+              <a:t>2023/6/7</a:t>
             </a:fld>
             <a:endParaRPr lang="zh-CN" altLang="en-US"/>
           </a:p>
@@ -1780,7 +1788,7 @@
           <a:p>
             <a:fld id="{C0956A83-B036-4B96-AF66-88CDD33BBE5A}" type="datetimeFigureOut">
               <a:rPr lang="zh-CN" altLang="en-US" smtClean="0"/>
-              <a:t>2023/5/24</a:t>
+              <a:t>2023/6/7</a:t>
             </a:fld>
             <a:endParaRPr lang="zh-CN" altLang="en-US"/>
           </a:p>
@@ -2055,7 +2063,7 @@
           <a:p>
             <a:fld id="{C0956A83-B036-4B96-AF66-88CDD33BBE5A}" type="datetimeFigureOut">
               <a:rPr lang="zh-CN" altLang="en-US" smtClean="0"/>
-              <a:t>2023/5/24</a:t>
+              <a:t>2023/6/7</a:t>
             </a:fld>
             <a:endParaRPr lang="zh-CN" altLang="en-US"/>
           </a:p>
@@ -2320,7 +2328,7 @@
           <a:p>
             <a:fld id="{C0956A83-B036-4B96-AF66-88CDD33BBE5A}" type="datetimeFigureOut">
               <a:rPr lang="zh-CN" altLang="en-US" smtClean="0"/>
-              <a:t>2023/5/24</a:t>
+              <a:t>2023/6/7</a:t>
             </a:fld>
             <a:endParaRPr lang="zh-CN" altLang="en-US"/>
           </a:p>
@@ -2732,7 +2740,7 @@
           <a:p>
             <a:fld id="{C0956A83-B036-4B96-AF66-88CDD33BBE5A}" type="datetimeFigureOut">
               <a:rPr lang="zh-CN" altLang="en-US" smtClean="0"/>
-              <a:t>2023/5/24</a:t>
+              <a:t>2023/6/7</a:t>
             </a:fld>
             <a:endParaRPr lang="zh-CN" altLang="en-US"/>
           </a:p>
@@ -2873,7 +2881,7 @@
           <a:p>
             <a:fld id="{C0956A83-B036-4B96-AF66-88CDD33BBE5A}" type="datetimeFigureOut">
               <a:rPr lang="zh-CN" altLang="en-US" smtClean="0"/>
-              <a:t>2023/5/24</a:t>
+              <a:t>2023/6/7</a:t>
             </a:fld>
             <a:endParaRPr lang="zh-CN" altLang="en-US"/>
           </a:p>
@@ -2986,7 +2994,7 @@
           <a:p>
             <a:fld id="{C0956A83-B036-4B96-AF66-88CDD33BBE5A}" type="datetimeFigureOut">
               <a:rPr lang="zh-CN" altLang="en-US" smtClean="0"/>
-              <a:t>2023/5/24</a:t>
+              <a:t>2023/6/7</a:t>
             </a:fld>
             <a:endParaRPr lang="zh-CN" altLang="en-US"/>
           </a:p>
@@ -3297,7 +3305,7 @@
           <a:p>
             <a:fld id="{C0956A83-B036-4B96-AF66-88CDD33BBE5A}" type="datetimeFigureOut">
               <a:rPr lang="zh-CN" altLang="en-US" smtClean="0"/>
-              <a:t>2023/5/24</a:t>
+              <a:t>2023/6/7</a:t>
             </a:fld>
             <a:endParaRPr lang="zh-CN" altLang="en-US"/>
           </a:p>
@@ -3585,7 +3593,7 @@
           <a:p>
             <a:fld id="{C0956A83-B036-4B96-AF66-88CDD33BBE5A}" type="datetimeFigureOut">
               <a:rPr lang="zh-CN" altLang="en-US" smtClean="0"/>
-              <a:t>2023/5/24</a:t>
+              <a:t>2023/6/7</a:t>
             </a:fld>
             <a:endParaRPr lang="zh-CN" altLang="en-US"/>
           </a:p>
@@ -3826,7 +3834,7 @@
           <a:p>
             <a:fld id="{C0956A83-B036-4B96-AF66-88CDD33BBE5A}" type="datetimeFigureOut">
               <a:rPr lang="zh-CN" altLang="en-US" smtClean="0"/>
-              <a:t>2023/5/24</a:t>
+              <a:t>2023/6/7</a:t>
             </a:fld>
             <a:endParaRPr lang="zh-CN" altLang="en-US"/>
           </a:p>

</xml_diff>